<commit_message>
Modified Report (added photo)
</commit_message>
<xml_diff>
--- a/JohnDayOvershoot_FinalReport.pptx
+++ b/JohnDayOvershoot_FinalReport.pptx
@@ -110,6 +110,11 @@
       </a:defRPr>
     </a:lvl9pPr>
   </p:defaultTextStyle>
+  <p:extLst>
+    <p:ext uri="{EFAFB233-063F-42B5-8137-9DF3F51BA10A}">
+      <p15:sldGuideLst xmlns:p15="http://schemas.microsoft.com/office/powerpoint/2012/main"/>
+    </p:ext>
+  </p:extLst>
 </p:presentation>
 </file>
 
@@ -12587,6 +12592,30 @@
           </a:p>
         </p:txBody>
       </p:sp>
+      <p:pic>
+        <p:nvPicPr>
+          <p:cNvPr id="2" name="Picture 1"/>
+          <p:cNvPicPr>
+            <a:picLocks noChangeAspect="1"/>
+          </p:cNvPicPr>
+          <p:nvPr/>
+        </p:nvPicPr>
+        <p:blipFill>
+          <a:blip r:embed="rId2"/>
+          <a:stretch>
+            <a:fillRect/>
+          </a:stretch>
+        </p:blipFill>
+        <p:spPr>
+          <a:xfrm>
+            <a:off x="7775194" y="2496065"/>
+            <a:ext cx="4149137" cy="4139420"/>
+          </a:xfrm>
+          <a:prstGeom prst="rect">
+            <a:avLst/>
+          </a:prstGeom>
+        </p:spPr>
+      </p:pic>
     </p:spTree>
     <p:extLst>
       <p:ext uri="{BB962C8B-B14F-4D97-AF65-F5344CB8AC3E}">
@@ -12807,11 +12836,7 @@
             <a:pPr lvl="1"/>
             <a:r>
               <a:rPr lang="en-US" dirty="0" smtClean="0"/>
-              <a:t>Set up an FTP server for eas</a:t>
-            </a:r>
-            <a:r>
-              <a:rPr lang="en-US" dirty="0" smtClean="0"/>
-              <a:t>e of data transfer and integration with R</a:t>
+              <a:t>Set up an FTP server for ease of data transfer and integration with R</a:t>
             </a:r>
           </a:p>
           <a:p>
@@ -12855,7 +12880,6 @@
               <a:rPr lang="en-US" dirty="0" smtClean="0"/>
               <a:t>Thinking ahead to ‘21 &amp; ’22 for future acoustic research</a:t>
             </a:r>
-            <a:endParaRPr lang="en-US" dirty="0" smtClean="0"/>
           </a:p>
           <a:p>
             <a:endParaRPr lang="en-US" dirty="0" smtClean="0"/>

</xml_diff>

<commit_message>
Modify and add photos
</commit_message>
<xml_diff>
--- a/JohnDayOvershoot_FinalReport.pptx
+++ b/JohnDayOvershoot_FinalReport.pptx
@@ -249,7 +249,7 @@
           <a:p>
             <a:fld id="{F32CFFDF-F272-4AD4-8BC5-396131F69C3F}" type="datetimeFigureOut">
               <a:rPr lang="en-US" smtClean="0"/>
-              <a:t>12/1/2020</a:t>
+              <a:t>12/3/2020</a:t>
             </a:fld>
             <a:endParaRPr lang="en-US"/>
           </a:p>
@@ -419,7 +419,7 @@
           <a:p>
             <a:fld id="{F32CFFDF-F272-4AD4-8BC5-396131F69C3F}" type="datetimeFigureOut">
               <a:rPr lang="en-US" smtClean="0"/>
-              <a:t>12/1/2020</a:t>
+              <a:t>12/3/2020</a:t>
             </a:fld>
             <a:endParaRPr lang="en-US"/>
           </a:p>
@@ -599,7 +599,7 @@
           <a:p>
             <a:fld id="{F32CFFDF-F272-4AD4-8BC5-396131F69C3F}" type="datetimeFigureOut">
               <a:rPr lang="en-US" smtClean="0"/>
-              <a:t>12/1/2020</a:t>
+              <a:t>12/3/2020</a:t>
             </a:fld>
             <a:endParaRPr lang="en-US"/>
           </a:p>
@@ -822,7 +822,7 @@
           <a:p>
             <a:fld id="{DD31C2BB-4583-401F-9575-DBD56533F57D}" type="datetimeFigureOut">
               <a:rPr lang="en-US" smtClean="0"/>
-              <a:t>12/1/2020</a:t>
+              <a:t>12/3/2020</a:t>
             </a:fld>
             <a:endParaRPr lang="en-US"/>
           </a:p>
@@ -992,7 +992,7 @@
           <a:p>
             <a:fld id="{DD31C2BB-4583-401F-9575-DBD56533F57D}" type="datetimeFigureOut">
               <a:rPr lang="en-US" smtClean="0"/>
-              <a:t>12/1/2020</a:t>
+              <a:t>12/3/2020</a:t>
             </a:fld>
             <a:endParaRPr lang="en-US"/>
           </a:p>
@@ -1249,7 +1249,7 @@
           <a:p>
             <a:fld id="{DD31C2BB-4583-401F-9575-DBD56533F57D}" type="datetimeFigureOut">
               <a:rPr lang="en-US" smtClean="0"/>
-              <a:t>12/1/2020</a:t>
+              <a:t>12/3/2020</a:t>
             </a:fld>
             <a:endParaRPr lang="en-US"/>
           </a:p>
@@ -1481,7 +1481,7 @@
           <a:p>
             <a:fld id="{DD31C2BB-4583-401F-9575-DBD56533F57D}" type="datetimeFigureOut">
               <a:rPr lang="en-US" smtClean="0"/>
-              <a:t>12/1/2020</a:t>
+              <a:t>12/3/2020</a:t>
             </a:fld>
             <a:endParaRPr lang="en-US"/>
           </a:p>
@@ -1874,7 +1874,7 @@
           <a:p>
             <a:fld id="{DD31C2BB-4583-401F-9575-DBD56533F57D}" type="datetimeFigureOut">
               <a:rPr lang="en-US" smtClean="0"/>
-              <a:t>12/1/2020</a:t>
+              <a:t>12/3/2020</a:t>
             </a:fld>
             <a:endParaRPr lang="en-US"/>
           </a:p>
@@ -1992,7 +1992,7 @@
           <a:p>
             <a:fld id="{DD31C2BB-4583-401F-9575-DBD56533F57D}" type="datetimeFigureOut">
               <a:rPr lang="en-US" smtClean="0"/>
-              <a:t>12/1/2020</a:t>
+              <a:t>12/3/2020</a:t>
             </a:fld>
             <a:endParaRPr lang="en-US"/>
           </a:p>
@@ -2087,7 +2087,7 @@
           <a:p>
             <a:fld id="{DD31C2BB-4583-401F-9575-DBD56533F57D}" type="datetimeFigureOut">
               <a:rPr lang="en-US" smtClean="0"/>
-              <a:t>12/1/2020</a:t>
+              <a:t>12/3/2020</a:t>
             </a:fld>
             <a:endParaRPr lang="en-US"/>
           </a:p>
@@ -2360,7 +2360,7 @@
           <a:p>
             <a:fld id="{DD31C2BB-4583-401F-9575-DBD56533F57D}" type="datetimeFigureOut">
               <a:rPr lang="en-US" smtClean="0"/>
-              <a:t>12/1/2020</a:t>
+              <a:t>12/3/2020</a:t>
             </a:fld>
             <a:endParaRPr lang="en-US"/>
           </a:p>
@@ -2530,7 +2530,7 @@
           <a:p>
             <a:fld id="{F32CFFDF-F272-4AD4-8BC5-396131F69C3F}" type="datetimeFigureOut">
               <a:rPr lang="en-US" smtClean="0"/>
-              <a:t>12/1/2020</a:t>
+              <a:t>12/3/2020</a:t>
             </a:fld>
             <a:endParaRPr lang="en-US"/>
           </a:p>
@@ -2811,7 +2811,7 @@
           <a:p>
             <a:fld id="{DD31C2BB-4583-401F-9575-DBD56533F57D}" type="datetimeFigureOut">
               <a:rPr lang="en-US" smtClean="0"/>
-              <a:t>12/1/2020</a:t>
+              <a:t>12/3/2020</a:t>
             </a:fld>
             <a:endParaRPr lang="en-US"/>
           </a:p>
@@ -3092,7 +3092,7 @@
           <a:p>
             <a:fld id="{DD31C2BB-4583-401F-9575-DBD56533F57D}" type="datetimeFigureOut">
               <a:rPr lang="en-US" smtClean="0"/>
-              <a:t>12/1/2020</a:t>
+              <a:t>12/3/2020</a:t>
             </a:fld>
             <a:endParaRPr lang="en-US"/>
           </a:p>
@@ -3284,7 +3284,7 @@
           <a:p>
             <a:fld id="{DD31C2BB-4583-401F-9575-DBD56533F57D}" type="datetimeFigureOut">
               <a:rPr lang="en-US" smtClean="0"/>
-              <a:t>12/1/2020</a:t>
+              <a:t>12/3/2020</a:t>
             </a:fld>
             <a:endParaRPr lang="en-US"/>
           </a:p>
@@ -3545,7 +3545,7 @@
           <a:p>
             <a:fld id="{DD31C2BB-4583-401F-9575-DBD56533F57D}" type="datetimeFigureOut">
               <a:rPr lang="en-US" smtClean="0"/>
-              <a:t>12/1/2020</a:t>
+              <a:t>12/3/2020</a:t>
             </a:fld>
             <a:endParaRPr lang="en-US"/>
           </a:p>
@@ -3971,7 +3971,7 @@
           <a:p>
             <a:fld id="{DD31C2BB-4583-401F-9575-DBD56533F57D}" type="datetimeFigureOut">
               <a:rPr lang="en-US" smtClean="0"/>
-              <a:t>12/1/2020</a:t>
+              <a:t>12/3/2020</a:t>
             </a:fld>
             <a:endParaRPr lang="en-US"/>
           </a:p>
@@ -4517,7 +4517,7 @@
           <a:p>
             <a:fld id="{DD31C2BB-4583-401F-9575-DBD56533F57D}" type="datetimeFigureOut">
               <a:rPr lang="en-US" smtClean="0"/>
-              <a:t>12/1/2020</a:t>
+              <a:t>12/3/2020</a:t>
             </a:fld>
             <a:endParaRPr lang="en-US"/>
           </a:p>
@@ -5348,7 +5348,7 @@
           <a:p>
             <a:fld id="{DD31C2BB-4583-401F-9575-DBD56533F57D}" type="datetimeFigureOut">
               <a:rPr lang="en-US" smtClean="0"/>
-              <a:t>12/1/2020</a:t>
+              <a:t>12/3/2020</a:t>
             </a:fld>
             <a:endParaRPr lang="en-US"/>
           </a:p>
@@ -5518,7 +5518,7 @@
           <a:p>
             <a:fld id="{DD31C2BB-4583-401F-9575-DBD56533F57D}" type="datetimeFigureOut">
               <a:rPr lang="en-US" smtClean="0"/>
-              <a:t>12/1/2020</a:t>
+              <a:t>12/3/2020</a:t>
             </a:fld>
             <a:endParaRPr lang="en-US"/>
           </a:p>
@@ -5698,7 +5698,7 @@
           <a:p>
             <a:fld id="{DD31C2BB-4583-401F-9575-DBD56533F57D}" type="datetimeFigureOut">
               <a:rPr lang="en-US" smtClean="0"/>
-              <a:t>12/1/2020</a:t>
+              <a:t>12/3/2020</a:t>
             </a:fld>
             <a:endParaRPr lang="en-US"/>
           </a:p>
@@ -5944,7 +5944,7 @@
           <a:p>
             <a:fld id="{F32CFFDF-F272-4AD4-8BC5-396131F69C3F}" type="datetimeFigureOut">
               <a:rPr lang="en-US" smtClean="0"/>
-              <a:t>12/1/2020</a:t>
+              <a:t>12/3/2020</a:t>
             </a:fld>
             <a:endParaRPr lang="en-US"/>
           </a:p>
@@ -6176,7 +6176,7 @@
           <a:p>
             <a:fld id="{F32CFFDF-F272-4AD4-8BC5-396131F69C3F}" type="datetimeFigureOut">
               <a:rPr lang="en-US" smtClean="0"/>
-              <a:t>12/1/2020</a:t>
+              <a:t>12/3/2020</a:t>
             </a:fld>
             <a:endParaRPr lang="en-US"/>
           </a:p>
@@ -6543,7 +6543,7 @@
           <a:p>
             <a:fld id="{F32CFFDF-F272-4AD4-8BC5-396131F69C3F}" type="datetimeFigureOut">
               <a:rPr lang="en-US" smtClean="0"/>
-              <a:t>12/1/2020</a:t>
+              <a:t>12/3/2020</a:t>
             </a:fld>
             <a:endParaRPr lang="en-US"/>
           </a:p>
@@ -6661,7 +6661,7 @@
           <a:p>
             <a:fld id="{F32CFFDF-F272-4AD4-8BC5-396131F69C3F}" type="datetimeFigureOut">
               <a:rPr lang="en-US" smtClean="0"/>
-              <a:t>12/1/2020</a:t>
+              <a:t>12/3/2020</a:t>
             </a:fld>
             <a:endParaRPr lang="en-US"/>
           </a:p>
@@ -6756,7 +6756,7 @@
           <a:p>
             <a:fld id="{F32CFFDF-F272-4AD4-8BC5-396131F69C3F}" type="datetimeFigureOut">
               <a:rPr lang="en-US" smtClean="0"/>
-              <a:t>12/1/2020</a:t>
+              <a:t>12/3/2020</a:t>
             </a:fld>
             <a:endParaRPr lang="en-US"/>
           </a:p>
@@ -7033,7 +7033,7 @@
           <a:p>
             <a:fld id="{F32CFFDF-F272-4AD4-8BC5-396131F69C3F}" type="datetimeFigureOut">
               <a:rPr lang="en-US" smtClean="0"/>
-              <a:t>12/1/2020</a:t>
+              <a:t>12/3/2020</a:t>
             </a:fld>
             <a:endParaRPr lang="en-US"/>
           </a:p>
@@ -7286,7 +7286,7 @@
           <a:p>
             <a:fld id="{F32CFFDF-F272-4AD4-8BC5-396131F69C3F}" type="datetimeFigureOut">
               <a:rPr lang="en-US" smtClean="0"/>
-              <a:t>12/1/2020</a:t>
+              <a:t>12/3/2020</a:t>
             </a:fld>
             <a:endParaRPr lang="en-US"/>
           </a:p>
@@ -7499,7 +7499,7 @@
           <a:p>
             <a:fld id="{F32CFFDF-F272-4AD4-8BC5-396131F69C3F}" type="datetimeFigureOut">
               <a:rPr lang="en-US" smtClean="0"/>
-              <a:t>12/1/2020</a:t>
+              <a:t>12/3/2020</a:t>
             </a:fld>
             <a:endParaRPr lang="en-US"/>
           </a:p>
@@ -8066,7 +8066,7 @@
           <a:p>
             <a:fld id="{DD31C2BB-4583-401F-9575-DBD56533F57D}" type="datetimeFigureOut">
               <a:rPr lang="en-US" smtClean="0"/>
-              <a:t>12/1/2020</a:t>
+              <a:t>12/3/2020</a:t>
             </a:fld>
             <a:endParaRPr lang="en-US"/>
           </a:p>
@@ -12717,7 +12717,11 @@
           <a:p>
             <a:r>
               <a:rPr lang="en-US" dirty="0" smtClean="0"/>
-              <a:t>Feel comfortable using GitHub and </a:t>
+              <a:t>Comfortable </a:t>
+            </a:r>
+            <a:r>
+              <a:rPr lang="en-US" dirty="0" smtClean="0"/>
+              <a:t>using GitHub and </a:t>
             </a:r>
             <a:r>
               <a:rPr lang="en-US" dirty="0" err="1" smtClean="0"/>
@@ -12968,7 +12972,7 @@
         <p:spPr/>
         <p:txBody>
           <a:bodyPr>
-            <a:normAutofit fontScale="92500" lnSpcReduction="20000"/>
+            <a:normAutofit/>
           </a:bodyPr>
           <a:lstStyle/>
           <a:p>
@@ -12994,24 +12998,9 @@
             </a:r>
           </a:p>
           <a:p>
-            <a:pPr lvl="2"/>
-            <a:endParaRPr lang="en-US" dirty="0" smtClean="0"/>
-          </a:p>
-          <a:p>
-            <a:r>
-              <a:rPr lang="en-US" dirty="0" smtClean="0"/>
-              <a:t>Sort acoustic data and format similar to PIT detections</a:t>
-            </a:r>
-          </a:p>
-          <a:p>
-            <a:pPr lvl="2"/>
-            <a:r>
-              <a:rPr lang="en-US" dirty="0" smtClean="0"/>
-              <a:t>Using downstream locations as reproducibility check</a:t>
-            </a:r>
-          </a:p>
-          <a:p>
-            <a:pPr lvl="2"/>
+            <a:pPr marL="914400" lvl="2" indent="0">
+              <a:buNone/>
+            </a:pPr>
             <a:endParaRPr lang="en-US" dirty="0"/>
           </a:p>
           <a:p>
@@ -13019,6 +13008,7 @@
               <a:rPr lang="en-US" dirty="0" smtClean="0"/>
               <a:t>Run analyses for acoustic detections </a:t>
             </a:r>
+            <a:endParaRPr lang="en-US" dirty="0" smtClean="0"/>
           </a:p>
           <a:p>
             <a:endParaRPr lang="en-US" dirty="0"/>
@@ -13026,12 +13016,46 @@
           <a:p>
             <a:r>
               <a:rPr lang="en-US" dirty="0" smtClean="0"/>
-              <a:t>Run similar analyses for downstream cold water tributary use</a:t>
+              <a:t>Completely transition over </a:t>
+            </a:r>
+            <a:r>
+              <a:rPr lang="en-US" dirty="0" smtClean="0"/>
+              <a:t>to Latex</a:t>
             </a:r>
             <a:endParaRPr lang="en-US" dirty="0"/>
           </a:p>
         </p:txBody>
       </p:sp>
+      <p:pic>
+        <p:nvPicPr>
+          <p:cNvPr id="4" name="Picture 3"/>
+          <p:cNvPicPr>
+            <a:picLocks noChangeAspect="1"/>
+          </p:cNvPicPr>
+          <p:nvPr/>
+        </p:nvPicPr>
+        <p:blipFill>
+          <a:blip r:embed="rId2" cstate="print">
+            <a:extLst>
+              <a:ext uri="{28A0092B-C50C-407E-A947-70E740481C1C}">
+                <a14:useLocalDpi xmlns:a14="http://schemas.microsoft.com/office/drawing/2010/main" val="0"/>
+              </a:ext>
+            </a:extLst>
+          </a:blip>
+          <a:stretch>
+            <a:fillRect/>
+          </a:stretch>
+        </p:blipFill>
+        <p:spPr>
+          <a:xfrm>
+            <a:off x="7441511" y="3426941"/>
+            <a:ext cx="4388022" cy="3291016"/>
+          </a:xfrm>
+          <a:prstGeom prst="rect">
+            <a:avLst/>
+          </a:prstGeom>
+        </p:spPr>
+      </p:pic>
     </p:spTree>
     <p:extLst>
       <p:ext uri="{BB962C8B-B14F-4D97-AF65-F5344CB8AC3E}">

</xml_diff>